<commit_message>
Update Developer Guide (#187)
* Add prefaces
* Update diagrams
* Add implementation of `library` command
</commit_message>
<xml_diff>
--- a/docs/diagrams/RecentCommandListFour.pptx
+++ b/docs/diagrams/RecentCommandListFour.pptx
@@ -261,7 +261,7 @@
           <a:p>
             <a:fld id="{03EC4E3E-8101-482F-A883-8B55DAFF7C07}" type="datetimeFigureOut">
               <a:rPr lang="en-SG" smtClean="0"/>
-              <a:t>23/3/2018</a:t>
+              <a:t>14/4/2018</a:t>
             </a:fld>
             <a:endParaRPr lang="en-SG"/>
           </a:p>
@@ -461,7 +461,7 @@
           <a:p>
             <a:fld id="{03EC4E3E-8101-482F-A883-8B55DAFF7C07}" type="datetimeFigureOut">
               <a:rPr lang="en-SG" smtClean="0"/>
-              <a:t>23/3/2018</a:t>
+              <a:t>14/4/2018</a:t>
             </a:fld>
             <a:endParaRPr lang="en-SG"/>
           </a:p>
@@ -671,7 +671,7 @@
           <a:p>
             <a:fld id="{03EC4E3E-8101-482F-A883-8B55DAFF7C07}" type="datetimeFigureOut">
               <a:rPr lang="en-SG" smtClean="0"/>
-              <a:t>23/3/2018</a:t>
+              <a:t>14/4/2018</a:t>
             </a:fld>
             <a:endParaRPr lang="en-SG"/>
           </a:p>
@@ -871,7 +871,7 @@
           <a:p>
             <a:fld id="{03EC4E3E-8101-482F-A883-8B55DAFF7C07}" type="datetimeFigureOut">
               <a:rPr lang="en-SG" smtClean="0"/>
-              <a:t>23/3/2018</a:t>
+              <a:t>14/4/2018</a:t>
             </a:fld>
             <a:endParaRPr lang="en-SG"/>
           </a:p>
@@ -1147,7 +1147,7 @@
           <a:p>
             <a:fld id="{03EC4E3E-8101-482F-A883-8B55DAFF7C07}" type="datetimeFigureOut">
               <a:rPr lang="en-SG" smtClean="0"/>
-              <a:t>23/3/2018</a:t>
+              <a:t>14/4/2018</a:t>
             </a:fld>
             <a:endParaRPr lang="en-SG"/>
           </a:p>
@@ -1415,7 +1415,7 @@
           <a:p>
             <a:fld id="{03EC4E3E-8101-482F-A883-8B55DAFF7C07}" type="datetimeFigureOut">
               <a:rPr lang="en-SG" smtClean="0"/>
-              <a:t>23/3/2018</a:t>
+              <a:t>14/4/2018</a:t>
             </a:fld>
             <a:endParaRPr lang="en-SG"/>
           </a:p>
@@ -1830,7 +1830,7 @@
           <a:p>
             <a:fld id="{03EC4E3E-8101-482F-A883-8B55DAFF7C07}" type="datetimeFigureOut">
               <a:rPr lang="en-SG" smtClean="0"/>
-              <a:t>23/3/2018</a:t>
+              <a:t>14/4/2018</a:t>
             </a:fld>
             <a:endParaRPr lang="en-SG"/>
           </a:p>
@@ -1972,7 +1972,7 @@
           <a:p>
             <a:fld id="{03EC4E3E-8101-482F-A883-8B55DAFF7C07}" type="datetimeFigureOut">
               <a:rPr lang="en-SG" smtClean="0"/>
-              <a:t>23/3/2018</a:t>
+              <a:t>14/4/2018</a:t>
             </a:fld>
             <a:endParaRPr lang="en-SG"/>
           </a:p>
@@ -2085,7 +2085,7 @@
           <a:p>
             <a:fld id="{03EC4E3E-8101-482F-A883-8B55DAFF7C07}" type="datetimeFigureOut">
               <a:rPr lang="en-SG" smtClean="0"/>
-              <a:t>23/3/2018</a:t>
+              <a:t>14/4/2018</a:t>
             </a:fld>
             <a:endParaRPr lang="en-SG"/>
           </a:p>
@@ -2398,7 +2398,7 @@
           <a:p>
             <a:fld id="{03EC4E3E-8101-482F-A883-8B55DAFF7C07}" type="datetimeFigureOut">
               <a:rPr lang="en-SG" smtClean="0"/>
-              <a:t>23/3/2018</a:t>
+              <a:t>14/4/2018</a:t>
             </a:fld>
             <a:endParaRPr lang="en-SG"/>
           </a:p>
@@ -2687,7 +2687,7 @@
           <a:p>
             <a:fld id="{03EC4E3E-8101-482F-A883-8B55DAFF7C07}" type="datetimeFigureOut">
               <a:rPr lang="en-SG" smtClean="0"/>
-              <a:t>23/3/2018</a:t>
+              <a:t>14/4/2018</a:t>
             </a:fld>
             <a:endParaRPr lang="en-SG"/>
           </a:p>
@@ -2930,7 +2930,7 @@
           <a:p>
             <a:fld id="{03EC4E3E-8101-482F-A883-8B55DAFF7C07}" type="datetimeFigureOut">
               <a:rPr lang="en-SG" smtClean="0"/>
-              <a:t>23/3/2018</a:t>
+              <a:t>14/4/2018</a:t>
             </a:fld>
             <a:endParaRPr lang="en-SG"/>
           </a:p>
@@ -3349,10 +3349,10 @@
       </p:grpSpPr>
       <p:sp>
         <p:nvSpPr>
-          <p:cNvPr id="2" name="Rectangle 1">
-            <a:extLst>
-              <a:ext uri="{FF2B5EF4-FFF2-40B4-BE49-F238E27FC236}">
-                <a16:creationId xmlns:a16="http://schemas.microsoft.com/office/drawing/2014/main" id="{E4C5B53F-0D7D-4074-84B3-E75C9156976C}"/>
+          <p:cNvPr id="22" name="Rectangle 21">
+            <a:extLst>
+              <a:ext uri="{FF2B5EF4-FFF2-40B4-BE49-F238E27FC236}">
+                <a16:creationId xmlns:a16="http://schemas.microsoft.com/office/drawing/2014/main" id="{BC6B70A6-86C4-4027-8B91-3BB58438CE6E}"/>
               </a:ext>
             </a:extLst>
           </p:cNvPr>
@@ -3361,8 +3361,8 @@
         </p:nvSpPr>
         <p:spPr>
           <a:xfrm>
-            <a:off x="4190260" y="741684"/>
-            <a:ext cx="5832629" cy="1171852"/>
+            <a:off x="4190261" y="4089535"/>
+            <a:ext cx="4041760" cy="1171852"/>
           </a:xfrm>
           <a:prstGeom prst="rect">
             <a:avLst/>
@@ -3403,10 +3403,64 @@
       </p:sp>
       <p:sp>
         <p:nvSpPr>
-          <p:cNvPr id="18" name="TextBox 17">
-            <a:extLst>
-              <a:ext uri="{FF2B5EF4-FFF2-40B4-BE49-F238E27FC236}">
-                <a16:creationId xmlns:a16="http://schemas.microsoft.com/office/drawing/2014/main" id="{8C33FEE6-A6CF-4901-A479-CA2516631721}"/>
+          <p:cNvPr id="29" name="Rectangle 28">
+            <a:extLst>
+              <a:ext uri="{FF2B5EF4-FFF2-40B4-BE49-F238E27FC236}">
+                <a16:creationId xmlns:a16="http://schemas.microsoft.com/office/drawing/2014/main" id="{F2EB5595-C045-4D18-9AC9-F23CCC471352}"/>
+              </a:ext>
+            </a:extLst>
+          </p:cNvPr>
+          <p:cNvSpPr/>
+          <p:nvPr/>
+        </p:nvSpPr>
+        <p:spPr>
+          <a:xfrm>
+            <a:off x="4190261" y="741684"/>
+            <a:ext cx="4041760" cy="1171852"/>
+          </a:xfrm>
+          <a:prstGeom prst="rect">
+            <a:avLst/>
+          </a:prstGeom>
+          <a:solidFill>
+            <a:schemeClr val="bg1"/>
+          </a:solidFill>
+          <a:ln w="28575">
+            <a:solidFill>
+              <a:schemeClr val="tx1"/>
+            </a:solidFill>
+          </a:ln>
+        </p:spPr>
+        <p:style>
+          <a:lnRef idx="2">
+            <a:schemeClr val="accent1">
+              <a:shade val="50000"/>
+            </a:schemeClr>
+          </a:lnRef>
+          <a:fillRef idx="1">
+            <a:schemeClr val="accent1"/>
+          </a:fillRef>
+          <a:effectRef idx="0">
+            <a:schemeClr val="accent1"/>
+          </a:effectRef>
+          <a:fontRef idx="minor">
+            <a:schemeClr val="lt1"/>
+          </a:fontRef>
+        </p:style>
+        <p:txBody>
+          <a:bodyPr rtlCol="0" anchor="ctr"/>
+          <a:lstStyle/>
+          <a:p>
+            <a:pPr algn="ctr"/>
+            <a:endParaRPr lang="en-SG"/>
+          </a:p>
+        </p:txBody>
+      </p:sp>
+      <p:sp>
+        <p:nvSpPr>
+          <p:cNvPr id="30" name="TextBox 29">
+            <a:extLst>
+              <a:ext uri="{FF2B5EF4-FFF2-40B4-BE49-F238E27FC236}">
+                <a16:creationId xmlns:a16="http://schemas.microsoft.com/office/drawing/2014/main" id="{817C73FD-4418-447D-B1E9-59C0954D31B2}"/>
               </a:ext>
             </a:extLst>
           </p:cNvPr>
@@ -3415,7 +3469,7 @@
         </p:nvSpPr>
         <p:spPr>
           <a:xfrm>
-            <a:off x="5768951" y="1974706"/>
+            <a:off x="4899767" y="1956069"/>
             <a:ext cx="2463069" cy="365972"/>
           </a:xfrm>
           <a:prstGeom prst="rect">
@@ -3444,10 +3498,10 @@
       </p:sp>
       <p:sp>
         <p:nvSpPr>
-          <p:cNvPr id="19" name="Rectangle 18">
-            <a:extLst>
-              <a:ext uri="{FF2B5EF4-FFF2-40B4-BE49-F238E27FC236}">
-                <a16:creationId xmlns:a16="http://schemas.microsoft.com/office/drawing/2014/main" id="{1A304ACE-1749-4239-BB54-EAD1AA63C0B7}"/>
+          <p:cNvPr id="31" name="Rectangle 30">
+            <a:extLst>
+              <a:ext uri="{FF2B5EF4-FFF2-40B4-BE49-F238E27FC236}">
+                <a16:creationId xmlns:a16="http://schemas.microsoft.com/office/drawing/2014/main" id="{27918DA4-3DD3-4744-A0CF-1A1C730D60C3}"/>
               </a:ext>
             </a:extLst>
           </p:cNvPr>
@@ -3456,7 +3510,7 @@
         </p:nvSpPr>
         <p:spPr>
           <a:xfrm>
-            <a:off x="952336" y="741684"/>
+            <a:off x="1427125" y="741684"/>
             <a:ext cx="1954621" cy="4944862"/>
           </a:xfrm>
           <a:prstGeom prst="rect">
@@ -3577,10 +3631,10 @@
       </p:sp>
       <p:graphicFrame>
         <p:nvGraphicFramePr>
-          <p:cNvPr id="20" name="Table 19">
-            <a:extLst>
-              <a:ext uri="{FF2B5EF4-FFF2-40B4-BE49-F238E27FC236}">
-                <a16:creationId xmlns:a16="http://schemas.microsoft.com/office/drawing/2014/main" id="{E9736894-3C1E-424F-8975-C8DE0E3D7231}"/>
+          <p:cNvPr id="34" name="Table 33">
+            <a:extLst>
+              <a:ext uri="{FF2B5EF4-FFF2-40B4-BE49-F238E27FC236}">
+                <a16:creationId xmlns:a16="http://schemas.microsoft.com/office/drawing/2014/main" id="{A0D7881B-D145-45ED-89CB-0C5E214455B3}"/>
               </a:ext>
             </a:extLst>
           </p:cNvPr>
@@ -3590,13 +3644,13 @@
           <p:nvPr>
             <p:extLst>
               <p:ext uri="{D42A27DB-BD31-4B8C-83A1-F6EECF244321}">
-                <p14:modId xmlns:p14="http://schemas.microsoft.com/office/powerpoint/2010/main" val="833391921"/>
+                <p14:modId xmlns:p14="http://schemas.microsoft.com/office/powerpoint/2010/main" val="4214611867"/>
               </p:ext>
             </p:extLst>
           </p:nvPr>
         </p:nvGraphicFramePr>
         <p:xfrm>
-          <a:off x="1012945" y="811911"/>
+          <a:off x="1487734" y="811911"/>
           <a:ext cx="1811044" cy="1005840"/>
         </p:xfrm>
         <a:graphic>
@@ -3690,10 +3744,10 @@
       </p:graphicFrame>
       <p:graphicFrame>
         <p:nvGraphicFramePr>
-          <p:cNvPr id="21" name="Table 20">
-            <a:extLst>
-              <a:ext uri="{FF2B5EF4-FFF2-40B4-BE49-F238E27FC236}">
-                <a16:creationId xmlns:a16="http://schemas.microsoft.com/office/drawing/2014/main" id="{DFAA59B9-905E-4147-ACBA-DA505353D12A}"/>
+          <p:cNvPr id="35" name="Table 34">
+            <a:extLst>
+              <a:ext uri="{FF2B5EF4-FFF2-40B4-BE49-F238E27FC236}">
+                <a16:creationId xmlns:a16="http://schemas.microsoft.com/office/drawing/2014/main" id="{57AFF221-88A9-445B-9CD5-762C4644B1E8}"/>
               </a:ext>
             </a:extLst>
           </p:cNvPr>
@@ -3703,13 +3757,13 @@
           <p:nvPr>
             <p:extLst>
               <p:ext uri="{D42A27DB-BD31-4B8C-83A1-F6EECF244321}">
-                <p14:modId xmlns:p14="http://schemas.microsoft.com/office/powerpoint/2010/main" val="927432962"/>
+                <p14:modId xmlns:p14="http://schemas.microsoft.com/office/powerpoint/2010/main" val="2521088717"/>
               </p:ext>
             </p:extLst>
           </p:nvPr>
         </p:nvGraphicFramePr>
         <p:xfrm>
-          <a:off x="1012945" y="1913536"/>
+          <a:off x="1487734" y="1913536"/>
           <a:ext cx="1811044" cy="1005840"/>
         </p:xfrm>
         <a:graphic>
@@ -3803,10 +3857,10 @@
       </p:graphicFrame>
       <p:graphicFrame>
         <p:nvGraphicFramePr>
-          <p:cNvPr id="25" name="Table 24">
-            <a:extLst>
-              <a:ext uri="{FF2B5EF4-FFF2-40B4-BE49-F238E27FC236}">
-                <a16:creationId xmlns:a16="http://schemas.microsoft.com/office/drawing/2014/main" id="{3335FB90-5441-4861-BDA2-CA7CF06AAE41}"/>
+          <p:cNvPr id="41" name="Table 40">
+            <a:extLst>
+              <a:ext uri="{FF2B5EF4-FFF2-40B4-BE49-F238E27FC236}">
+                <a16:creationId xmlns:a16="http://schemas.microsoft.com/office/drawing/2014/main" id="{EDD38270-F695-46C1-9227-727D71D75529}"/>
               </a:ext>
             </a:extLst>
           </p:cNvPr>
@@ -3816,13 +3870,13 @@
           <p:nvPr>
             <p:extLst>
               <p:ext uri="{D42A27DB-BD31-4B8C-83A1-F6EECF244321}">
-                <p14:modId xmlns:p14="http://schemas.microsoft.com/office/powerpoint/2010/main" val="2103229736"/>
+                <p14:modId xmlns:p14="http://schemas.microsoft.com/office/powerpoint/2010/main" val="1708683517"/>
               </p:ext>
             </p:extLst>
           </p:nvPr>
         </p:nvGraphicFramePr>
         <p:xfrm>
-          <a:off x="1012945" y="3015161"/>
+          <a:off x="1487734" y="3015161"/>
           <a:ext cx="1811044" cy="1005840"/>
         </p:xfrm>
         <a:graphic>
@@ -3916,10 +3970,10 @@
       </p:graphicFrame>
       <p:graphicFrame>
         <p:nvGraphicFramePr>
-          <p:cNvPr id="26" name="Table 25">
-            <a:extLst>
-              <a:ext uri="{FF2B5EF4-FFF2-40B4-BE49-F238E27FC236}">
-                <a16:creationId xmlns:a16="http://schemas.microsoft.com/office/drawing/2014/main" id="{A5678E8D-7AA1-45DE-A9E4-80D10FD09B01}"/>
+          <p:cNvPr id="42" name="Table 41">
+            <a:extLst>
+              <a:ext uri="{FF2B5EF4-FFF2-40B4-BE49-F238E27FC236}">
+                <a16:creationId xmlns:a16="http://schemas.microsoft.com/office/drawing/2014/main" id="{61C9D13A-2F47-4613-817D-6E46D64387F4}"/>
               </a:ext>
             </a:extLst>
           </p:cNvPr>
@@ -3929,13 +3983,13 @@
           <p:nvPr>
             <p:extLst>
               <p:ext uri="{D42A27DB-BD31-4B8C-83A1-F6EECF244321}">
-                <p14:modId xmlns:p14="http://schemas.microsoft.com/office/powerpoint/2010/main" val="3576041711"/>
+                <p14:modId xmlns:p14="http://schemas.microsoft.com/office/powerpoint/2010/main" val="1165861235"/>
               </p:ext>
             </p:extLst>
           </p:nvPr>
         </p:nvGraphicFramePr>
         <p:xfrm>
-          <a:off x="1012945" y="4116786"/>
+          <a:off x="1498913" y="4113916"/>
           <a:ext cx="1811044" cy="1005840"/>
         </p:xfrm>
         <a:graphic>
@@ -4029,10 +4083,10 @@
       </p:graphicFrame>
       <p:sp>
         <p:nvSpPr>
-          <p:cNvPr id="27" name="TextBox 26">
-            <a:extLst>
-              <a:ext uri="{FF2B5EF4-FFF2-40B4-BE49-F238E27FC236}">
-                <a16:creationId xmlns:a16="http://schemas.microsoft.com/office/drawing/2014/main" id="{59DF0A81-4B85-47B1-B6DE-D6CE2E806D63}"/>
+          <p:cNvPr id="43" name="TextBox 42">
+            <a:extLst>
+              <a:ext uri="{FF2B5EF4-FFF2-40B4-BE49-F238E27FC236}">
+                <a16:creationId xmlns:a16="http://schemas.microsoft.com/office/drawing/2014/main" id="{9FB5E9B5-8D72-4FB6-9886-FDC26E494D55}"/>
               </a:ext>
             </a:extLst>
           </p:cNvPr>
@@ -4041,7 +4095,7 @@
         </p:nvSpPr>
         <p:spPr>
           <a:xfrm>
-            <a:off x="772302" y="5693831"/>
+            <a:off x="1247091" y="5693831"/>
             <a:ext cx="2463069" cy="365972"/>
           </a:xfrm>
           <a:prstGeom prst="rect">
@@ -4068,66 +4122,12 @@
           </a:p>
         </p:txBody>
       </p:sp>
-      <p:sp>
-        <p:nvSpPr>
-          <p:cNvPr id="32" name="Rectangle 31">
-            <a:extLst>
-              <a:ext uri="{FF2B5EF4-FFF2-40B4-BE49-F238E27FC236}">
-                <a16:creationId xmlns:a16="http://schemas.microsoft.com/office/drawing/2014/main" id="{910A776F-3E8D-4C08-9F8C-8917A66806C4}"/>
-              </a:ext>
-            </a:extLst>
-          </p:cNvPr>
-          <p:cNvSpPr/>
-          <p:nvPr/>
-        </p:nvSpPr>
-        <p:spPr>
-          <a:xfrm>
-            <a:off x="4190260" y="4089535"/>
-            <a:ext cx="5832629" cy="1171852"/>
-          </a:xfrm>
-          <a:prstGeom prst="rect">
-            <a:avLst/>
-          </a:prstGeom>
-          <a:solidFill>
-            <a:schemeClr val="bg1"/>
-          </a:solidFill>
-          <a:ln w="28575">
-            <a:solidFill>
-              <a:schemeClr val="tx1"/>
-            </a:solidFill>
-          </a:ln>
-        </p:spPr>
-        <p:style>
-          <a:lnRef idx="2">
-            <a:schemeClr val="accent1">
-              <a:shade val="50000"/>
-            </a:schemeClr>
-          </a:lnRef>
-          <a:fillRef idx="1">
-            <a:schemeClr val="accent1"/>
-          </a:fillRef>
-          <a:effectRef idx="0">
-            <a:schemeClr val="accent1"/>
-          </a:effectRef>
-          <a:fontRef idx="minor">
-            <a:schemeClr val="lt1"/>
-          </a:fontRef>
-        </p:style>
-        <p:txBody>
-          <a:bodyPr rtlCol="0" anchor="ctr"/>
-          <a:lstStyle/>
-          <a:p>
-            <a:pPr algn="ctr"/>
-            <a:endParaRPr lang="en-SG"/>
-          </a:p>
-        </p:txBody>
-      </p:sp>
       <p:graphicFrame>
         <p:nvGraphicFramePr>
-          <p:cNvPr id="33" name="Table 32">
-            <a:extLst>
-              <a:ext uri="{FF2B5EF4-FFF2-40B4-BE49-F238E27FC236}">
-                <a16:creationId xmlns:a16="http://schemas.microsoft.com/office/drawing/2014/main" id="{D924B554-DCBC-4509-9099-8CD5DE822B4F}"/>
+          <p:cNvPr id="44" name="Table 43">
+            <a:extLst>
+              <a:ext uri="{FF2B5EF4-FFF2-40B4-BE49-F238E27FC236}">
+                <a16:creationId xmlns:a16="http://schemas.microsoft.com/office/drawing/2014/main" id="{0A38D683-B5DF-4E52-862E-EBF6CE7F3176}"/>
               </a:ext>
             </a:extLst>
           </p:cNvPr>
@@ -4137,7 +4137,7 @@
           <p:nvPr>
             <p:extLst>
               <p:ext uri="{D42A27DB-BD31-4B8C-83A1-F6EECF244321}">
-                <p14:modId xmlns:p14="http://schemas.microsoft.com/office/powerpoint/2010/main" val="2342039191"/>
+                <p14:modId xmlns:p14="http://schemas.microsoft.com/office/powerpoint/2010/main" val="3230581339"/>
               </p:ext>
             </p:extLst>
           </p:nvPr>
@@ -4231,10 +4231,10 @@
       </p:graphicFrame>
       <p:sp>
         <p:nvSpPr>
-          <p:cNvPr id="36" name="TextBox 35">
-            <a:extLst>
-              <a:ext uri="{FF2B5EF4-FFF2-40B4-BE49-F238E27FC236}">
-                <a16:creationId xmlns:a16="http://schemas.microsoft.com/office/drawing/2014/main" id="{EA9CDF03-4B3A-4FF2-B7DF-D263BDA4BA18}"/>
+          <p:cNvPr id="45" name="TextBox 44">
+            <a:extLst>
+              <a:ext uri="{FF2B5EF4-FFF2-40B4-BE49-F238E27FC236}">
+                <a16:creationId xmlns:a16="http://schemas.microsoft.com/office/drawing/2014/main" id="{27724863-C8C6-40C3-AA66-4989B629E3AC}"/>
               </a:ext>
             </a:extLst>
           </p:cNvPr>
@@ -4243,7 +4243,7 @@
         </p:nvSpPr>
         <p:spPr>
           <a:xfrm>
-            <a:off x="5768951" y="5322557"/>
+            <a:off x="4899767" y="5303920"/>
             <a:ext cx="2463069" cy="365972"/>
           </a:xfrm>
           <a:prstGeom prst="rect">
@@ -4270,12 +4270,120 @@
           </a:p>
         </p:txBody>
       </p:sp>
+      <p:grpSp>
+        <p:nvGrpSpPr>
+          <p:cNvPr id="46" name="Group 45">
+            <a:extLst>
+              <a:ext uri="{FF2B5EF4-FFF2-40B4-BE49-F238E27FC236}">
+                <a16:creationId xmlns:a16="http://schemas.microsoft.com/office/drawing/2014/main" id="{9EEC80E6-C504-4322-AABB-93C2C4B43D31}"/>
+              </a:ext>
+            </a:extLst>
+          </p:cNvPr>
+          <p:cNvGrpSpPr/>
+          <p:nvPr/>
+        </p:nvGrpSpPr>
+        <p:grpSpPr>
+          <a:xfrm>
+            <a:off x="5329524" y="2445356"/>
+            <a:ext cx="1539462" cy="1415552"/>
+            <a:chOff x="6474978" y="2463993"/>
+            <a:chExt cx="1263192" cy="1415552"/>
+          </a:xfrm>
+        </p:grpSpPr>
+        <p:sp>
+          <p:nvSpPr>
+            <p:cNvPr id="47" name="Arrow: Right 46">
+              <a:extLst>
+                <a:ext uri="{FF2B5EF4-FFF2-40B4-BE49-F238E27FC236}">
+                  <a16:creationId xmlns:a16="http://schemas.microsoft.com/office/drawing/2014/main" id="{DE5BEF21-6095-4288-BA29-A2D6DA17F1B8}"/>
+                </a:ext>
+              </a:extLst>
+            </p:cNvPr>
+            <p:cNvSpPr/>
+            <p:nvPr/>
+          </p:nvSpPr>
+          <p:spPr>
+            <a:xfrm rot="5400000">
+              <a:off x="6398798" y="2540173"/>
+              <a:ext cx="1415552" cy="1263192"/>
+            </a:xfrm>
+            <a:prstGeom prst="rightArrow">
+              <a:avLst/>
+            </a:prstGeom>
+          </p:spPr>
+          <p:style>
+            <a:lnRef idx="2">
+              <a:schemeClr val="accent1">
+                <a:shade val="50000"/>
+              </a:schemeClr>
+            </a:lnRef>
+            <a:fillRef idx="1">
+              <a:schemeClr val="accent1"/>
+            </a:fillRef>
+            <a:effectRef idx="0">
+              <a:schemeClr val="accent1"/>
+            </a:effectRef>
+            <a:fontRef idx="minor">
+              <a:schemeClr val="lt1"/>
+            </a:fontRef>
+          </p:style>
+          <p:txBody>
+            <a:bodyPr lIns="0" rIns="0" rtlCol="0" anchor="ctr"/>
+            <a:lstStyle/>
+            <a:p>
+              <a:pPr algn="ctr"/>
+              <a:endParaRPr lang="en-SG" dirty="0">
+                <a:latin typeface="Consolas" panose="020B0609020204030204" pitchFamily="49" charset="0"/>
+              </a:endParaRPr>
+            </a:p>
+          </p:txBody>
+        </p:sp>
+        <p:sp>
+          <p:nvSpPr>
+            <p:cNvPr id="48" name="TextBox 47">
+              <a:extLst>
+                <a:ext uri="{FF2B5EF4-FFF2-40B4-BE49-F238E27FC236}">
+                  <a16:creationId xmlns:a16="http://schemas.microsoft.com/office/drawing/2014/main" id="{9C30E562-895F-409E-848E-354F412791A2}"/>
+                </a:ext>
+              </a:extLst>
+            </p:cNvPr>
+            <p:cNvSpPr txBox="1"/>
+            <p:nvPr/>
+          </p:nvSpPr>
+          <p:spPr>
+            <a:xfrm>
+              <a:off x="6728861" y="2866087"/>
+              <a:ext cx="740794" cy="369332"/>
+            </a:xfrm>
+            <a:prstGeom prst="rect">
+              <a:avLst/>
+            </a:prstGeom>
+            <a:noFill/>
+          </p:spPr>
+          <p:txBody>
+            <a:bodyPr wrap="none" rtlCol="0">
+              <a:spAutoFit/>
+            </a:bodyPr>
+            <a:lstStyle/>
+            <a:p>
+              <a:r>
+                <a:rPr lang="en-SG" dirty="0">
+                  <a:solidFill>
+                    <a:schemeClr val="bg1"/>
+                  </a:solidFill>
+                </a:rPr>
+                <a:t>select 3</a:t>
+              </a:r>
+            </a:p>
+          </p:txBody>
+        </p:sp>
+      </p:grpSp>
       <p:graphicFrame>
         <p:nvGraphicFramePr>
-          <p:cNvPr id="37" name="Table 36">
-            <a:extLst>
-              <a:ext uri="{FF2B5EF4-FFF2-40B4-BE49-F238E27FC236}">
-                <a16:creationId xmlns:a16="http://schemas.microsoft.com/office/drawing/2014/main" id="{91CEEE3E-AAE8-4D89-B888-02AD702576CA}"/>
+          <p:cNvPr id="49" name="Table 48">
+            <a:extLst>
+              <a:ext uri="{FF2B5EF4-FFF2-40B4-BE49-F238E27FC236}">
+                <a16:creationId xmlns:a16="http://schemas.microsoft.com/office/drawing/2014/main" id="{1F6E79CD-3948-412B-AD49-820AD5274D95}"/>
               </a:ext>
             </a:extLst>
           </p:cNvPr>
@@ -4285,13 +4393,13 @@
           <p:nvPr>
             <p:extLst>
               <p:ext uri="{D42A27DB-BD31-4B8C-83A1-F6EECF244321}">
-                <p14:modId xmlns:p14="http://schemas.microsoft.com/office/powerpoint/2010/main" val="3275285912"/>
+                <p14:modId xmlns:p14="http://schemas.microsoft.com/office/powerpoint/2010/main" val="2831242351"/>
               </p:ext>
             </p:extLst>
           </p:nvPr>
         </p:nvGraphicFramePr>
         <p:xfrm>
-          <a:off x="4249656" y="829665"/>
+          <a:off x="4249656" y="813781"/>
           <a:ext cx="1811044" cy="1003970"/>
         </p:xfrm>
         <a:graphic>
@@ -4379,10 +4487,10 @@
       </p:graphicFrame>
       <p:graphicFrame>
         <p:nvGraphicFramePr>
-          <p:cNvPr id="38" name="Table 37">
-            <a:extLst>
-              <a:ext uri="{FF2B5EF4-FFF2-40B4-BE49-F238E27FC236}">
-                <a16:creationId xmlns:a16="http://schemas.microsoft.com/office/drawing/2014/main" id="{EA3D1B6C-18FE-46C9-A450-B1DB2733C32D}"/>
+          <p:cNvPr id="50" name="Table 49">
+            <a:extLst>
+              <a:ext uri="{FF2B5EF4-FFF2-40B4-BE49-F238E27FC236}">
+                <a16:creationId xmlns:a16="http://schemas.microsoft.com/office/drawing/2014/main" id="{70840164-AB74-4119-BCCD-700E0BF06E5E}"/>
               </a:ext>
             </a:extLst>
           </p:cNvPr>
@@ -4392,13 +4500,13 @@
           <p:nvPr>
             <p:extLst>
               <p:ext uri="{D42A27DB-BD31-4B8C-83A1-F6EECF244321}">
-                <p14:modId xmlns:p14="http://schemas.microsoft.com/office/powerpoint/2010/main" val="2178102143"/>
+                <p14:modId xmlns:p14="http://schemas.microsoft.com/office/powerpoint/2010/main" val="2717885104"/>
               </p:ext>
             </p:extLst>
           </p:nvPr>
         </p:nvGraphicFramePr>
         <p:xfrm>
-          <a:off x="6198708" y="4173476"/>
+          <a:off x="6240838" y="4173476"/>
           <a:ext cx="1811044" cy="1003970"/>
         </p:xfrm>
         <a:graphic>
@@ -4486,10 +4594,10 @@
       </p:graphicFrame>
       <p:graphicFrame>
         <p:nvGraphicFramePr>
-          <p:cNvPr id="39" name="Table 38">
-            <a:extLst>
-              <a:ext uri="{FF2B5EF4-FFF2-40B4-BE49-F238E27FC236}">
-                <a16:creationId xmlns:a16="http://schemas.microsoft.com/office/drawing/2014/main" id="{CC4B566C-48A1-47DF-ADEB-83ABF4269A67}"/>
+          <p:cNvPr id="51" name="Table 50">
+            <a:extLst>
+              <a:ext uri="{FF2B5EF4-FFF2-40B4-BE49-F238E27FC236}">
+                <a16:creationId xmlns:a16="http://schemas.microsoft.com/office/drawing/2014/main" id="{588A03B5-9289-42FF-ABEE-E67DC7BB89C5}"/>
               </a:ext>
             </a:extLst>
           </p:cNvPr>
@@ -4499,13 +4607,13 @@
           <p:nvPr>
             <p:extLst>
               <p:ext uri="{D42A27DB-BD31-4B8C-83A1-F6EECF244321}">
-                <p14:modId xmlns:p14="http://schemas.microsoft.com/office/powerpoint/2010/main" val="4178092376"/>
+                <p14:modId xmlns:p14="http://schemas.microsoft.com/office/powerpoint/2010/main" val="3344018451"/>
               </p:ext>
             </p:extLst>
           </p:nvPr>
         </p:nvGraphicFramePr>
         <p:xfrm>
-          <a:off x="6198708" y="813781"/>
+          <a:off x="6240838" y="809958"/>
           <a:ext cx="1811044" cy="1003970"/>
         </p:xfrm>
         <a:graphic>
@@ -4591,226 +4699,6 @@
           </a:graphicData>
         </a:graphic>
       </p:graphicFrame>
-      <p:graphicFrame>
-        <p:nvGraphicFramePr>
-          <p:cNvPr id="40" name="Table 39">
-            <a:extLst>
-              <a:ext uri="{FF2B5EF4-FFF2-40B4-BE49-F238E27FC236}">
-                <a16:creationId xmlns:a16="http://schemas.microsoft.com/office/drawing/2014/main" id="{D1D87E2A-4B6B-4E87-BA1D-033528F51E16}"/>
-              </a:ext>
-            </a:extLst>
-          </p:cNvPr>
-          <p:cNvGraphicFramePr>
-            <a:graphicFrameLocks noGrp="1"/>
-          </p:cNvGraphicFramePr>
-          <p:nvPr>
-            <p:extLst>
-              <p:ext uri="{D42A27DB-BD31-4B8C-83A1-F6EECF244321}">
-                <p14:modId xmlns:p14="http://schemas.microsoft.com/office/powerpoint/2010/main" val="1382464291"/>
-              </p:ext>
-            </p:extLst>
-          </p:nvPr>
-        </p:nvGraphicFramePr>
-        <p:xfrm>
-          <a:off x="8110798" y="4173476"/>
-          <a:ext cx="1811044" cy="1003970"/>
-        </p:xfrm>
-        <a:graphic>
-          <a:graphicData uri="http://schemas.openxmlformats.org/drawingml/2006/table">
-            <a:tbl>
-              <a:tblPr>
-                <a:tableStyleId>{638B1855-1B75-4FBE-930C-398BA8C253C6}</a:tableStyleId>
-              </a:tblPr>
-              <a:tblGrid>
-                <a:gridCol w="1811044">
-                  <a:extLst>
-                    <a:ext uri="{9D8B030D-6E8A-4147-A177-3AD203B41FA5}">
-                      <a16:colId xmlns:a16="http://schemas.microsoft.com/office/drawing/2014/main" val="4240773277"/>
-                    </a:ext>
-                  </a:extLst>
-                </a:gridCol>
-              </a:tblGrid>
-              <a:tr h="364692">
-                <a:tc>
-                  <a:txBody>
-                    <a:bodyPr/>
-                    <a:lstStyle/>
-                    <a:p>
-                      <a:r>
-                        <a:rPr lang="en-SG" u="sng" dirty="0"/>
-                        <a:t>:Book</a:t>
-                      </a:r>
-                    </a:p>
-                  </a:txBody>
-                  <a:tcPr>
-                    <a:lnB w="12700" cap="flat" cmpd="sng" algn="ctr">
-                      <a:solidFill>
-                        <a:schemeClr val="bg1">
-                          <a:lumMod val="75000"/>
-                        </a:schemeClr>
-                      </a:solidFill>
-                      <a:prstDash val="solid"/>
-                      <a:round/>
-                      <a:headEnd type="none" w="med" len="med"/>
-                      <a:tailEnd type="none" w="med" len="med"/>
-                    </a:lnB>
-                  </a:tcPr>
-                </a:tc>
-                <a:extLst>
-                  <a:ext uri="{0D108BD9-81ED-4DB2-BD59-A6C34878D82A}">
-                    <a16:rowId xmlns:a16="http://schemas.microsoft.com/office/drawing/2014/main" val="2194462629"/>
-                  </a:ext>
-                </a:extLst>
-              </a:tr>
-              <a:tr h="638210">
-                <a:tc>
-                  <a:txBody>
-                    <a:bodyPr/>
-                    <a:lstStyle/>
-                    <a:p>
-                      <a:r>
-                        <a:rPr lang="en-SG" dirty="0"/>
-                        <a:t>title </a:t>
-                      </a:r>
-                      <a:r>
-                        <a:rPr lang="en-SG"/>
-                        <a:t>= “Two”</a:t>
-                      </a:r>
-                      <a:endParaRPr lang="en-SG" dirty="0"/>
-                    </a:p>
-                  </a:txBody>
-                  <a:tcPr>
-                    <a:lnT w="12700" cap="flat" cmpd="sng" algn="ctr">
-                      <a:solidFill>
-                        <a:schemeClr val="bg1">
-                          <a:lumMod val="75000"/>
-                        </a:schemeClr>
-                      </a:solidFill>
-                      <a:prstDash val="solid"/>
-                      <a:round/>
-                      <a:headEnd type="none" w="med" len="med"/>
-                      <a:tailEnd type="none" w="med" len="med"/>
-                    </a:lnT>
-                  </a:tcPr>
-                </a:tc>
-                <a:extLst>
-                  <a:ext uri="{0D108BD9-81ED-4DB2-BD59-A6C34878D82A}">
-                    <a16:rowId xmlns:a16="http://schemas.microsoft.com/office/drawing/2014/main" val="368623409"/>
-                  </a:ext>
-                </a:extLst>
-              </a:tr>
-            </a:tbl>
-          </a:graphicData>
-        </a:graphic>
-      </p:graphicFrame>
-      <p:grpSp>
-        <p:nvGrpSpPr>
-          <p:cNvPr id="23" name="Group 22">
-            <a:extLst>
-              <a:ext uri="{FF2B5EF4-FFF2-40B4-BE49-F238E27FC236}">
-                <a16:creationId xmlns:a16="http://schemas.microsoft.com/office/drawing/2014/main" id="{A2380E2B-DEAA-4EC4-95DD-709E84558C1E}"/>
-              </a:ext>
-            </a:extLst>
-          </p:cNvPr>
-          <p:cNvGrpSpPr/>
-          <p:nvPr/>
-        </p:nvGrpSpPr>
-        <p:grpSpPr>
-          <a:xfrm>
-            <a:off x="6198708" y="2463993"/>
-            <a:ext cx="1539462" cy="1415552"/>
-            <a:chOff x="6474978" y="2463993"/>
-            <a:chExt cx="1263192" cy="1415552"/>
-          </a:xfrm>
-        </p:grpSpPr>
-        <p:sp>
-          <p:nvSpPr>
-            <p:cNvPr id="24" name="Arrow: Right 23">
-              <a:extLst>
-                <a:ext uri="{FF2B5EF4-FFF2-40B4-BE49-F238E27FC236}">
-                  <a16:creationId xmlns:a16="http://schemas.microsoft.com/office/drawing/2014/main" id="{F9443173-4B73-4063-8A80-6A2B4B60CF89}"/>
-                </a:ext>
-              </a:extLst>
-            </p:cNvPr>
-            <p:cNvSpPr/>
-            <p:nvPr/>
-          </p:nvSpPr>
-          <p:spPr>
-            <a:xfrm rot="5400000">
-              <a:off x="6398798" y="2540173"/>
-              <a:ext cx="1415552" cy="1263192"/>
-            </a:xfrm>
-            <a:prstGeom prst="rightArrow">
-              <a:avLst/>
-            </a:prstGeom>
-          </p:spPr>
-          <p:style>
-            <a:lnRef idx="2">
-              <a:schemeClr val="accent1">
-                <a:shade val="50000"/>
-              </a:schemeClr>
-            </a:lnRef>
-            <a:fillRef idx="1">
-              <a:schemeClr val="accent1"/>
-            </a:fillRef>
-            <a:effectRef idx="0">
-              <a:schemeClr val="accent1"/>
-            </a:effectRef>
-            <a:fontRef idx="minor">
-              <a:schemeClr val="lt1"/>
-            </a:fontRef>
-          </p:style>
-          <p:txBody>
-            <a:bodyPr lIns="0" rIns="0" rtlCol="0" anchor="ctr"/>
-            <a:lstStyle/>
-            <a:p>
-              <a:pPr algn="ctr"/>
-              <a:endParaRPr lang="en-SG" dirty="0">
-                <a:latin typeface="Consolas" panose="020B0609020204030204" pitchFamily="49" charset="0"/>
-              </a:endParaRPr>
-            </a:p>
-          </p:txBody>
-        </p:sp>
-        <p:sp>
-          <p:nvSpPr>
-            <p:cNvPr id="28" name="TextBox 27">
-              <a:extLst>
-                <a:ext uri="{FF2B5EF4-FFF2-40B4-BE49-F238E27FC236}">
-                  <a16:creationId xmlns:a16="http://schemas.microsoft.com/office/drawing/2014/main" id="{34BA4F5F-0C02-43E9-BFA1-E0A3FE3C7660}"/>
-                </a:ext>
-              </a:extLst>
-            </p:cNvPr>
-            <p:cNvSpPr txBox="1"/>
-            <p:nvPr/>
-          </p:nvSpPr>
-          <p:spPr>
-            <a:xfrm>
-              <a:off x="6728861" y="2866087"/>
-              <a:ext cx="740794" cy="369332"/>
-            </a:xfrm>
-            <a:prstGeom prst="rect">
-              <a:avLst/>
-            </a:prstGeom>
-            <a:noFill/>
-          </p:spPr>
-          <p:txBody>
-            <a:bodyPr wrap="none" rtlCol="0">
-              <a:spAutoFit/>
-            </a:bodyPr>
-            <a:lstStyle/>
-            <a:p>
-              <a:r>
-                <a:rPr lang="en-SG" dirty="0">
-                  <a:solidFill>
-                    <a:schemeClr val="bg1"/>
-                  </a:solidFill>
-                </a:rPr>
-                <a:t>select 3</a:t>
-              </a:r>
-            </a:p>
-          </p:txBody>
-        </p:sp>
-      </p:grpSp>
     </p:spTree>
     <p:extLst>
       <p:ext uri="{BB962C8B-B14F-4D97-AF65-F5344CB8AC3E}">

</xml_diff>